<commit_message>
classes and objects basics
</commit_message>
<xml_diff>
--- a/Object Oriented Programming.pptx
+++ b/Object Oriented Programming.pptx
@@ -105,7 +105,105 @@
       </a:defRPr>
     </a:lvl9pPr>
   </p:defaultTextStyle>
+  <p:extLst>
+    <p:ext uri="{EFAFB233-063F-42B5-8137-9DF3F51BA10A}">
+      <p15:sldGuideLst xmlns:p15="http://schemas.microsoft.com/office/powerpoint/2012/main"/>
+    </p:ext>
+  </p:extLst>
 </p:presentation>
+</file>
+
+<file path=ppt/changesInfos/changesInfo1.xml><?xml version="1.0" encoding="utf-8"?>
+<pc:chgInfo xmlns:a="http://schemas.openxmlformats.org/drawingml/2006/main" xmlns:r="http://schemas.openxmlformats.org/officeDocument/2006/relationships" xmlns:ac="http://schemas.microsoft.com/office/drawing/2013/main/command" xmlns:pc="http://schemas.microsoft.com/office/powerpoint/2013/main/command">
+  <pc:docChgLst>
+    <pc:chgData name="Rajat Upadhyay" userId="807f1501-55ff-45fa-a951-74b911a5bfc0" providerId="ADAL" clId="{6A0EC888-83F7-466E-ABCD-08D676997D9C}"/>
+    <pc:docChg chg="modSld">
+      <pc:chgData name="Rajat Upadhyay" userId="807f1501-55ff-45fa-a951-74b911a5bfc0" providerId="ADAL" clId="{6A0EC888-83F7-466E-ABCD-08D676997D9C}" dt="2021-08-01T08:48:53.900" v="13" actId="1076"/>
+      <pc:docMkLst>
+        <pc:docMk/>
+      </pc:docMkLst>
+      <pc:sldChg chg="modSp mod">
+        <pc:chgData name="Rajat Upadhyay" userId="807f1501-55ff-45fa-a951-74b911a5bfc0" providerId="ADAL" clId="{6A0EC888-83F7-466E-ABCD-08D676997D9C}" dt="2021-08-01T08:48:53.900" v="13" actId="1076"/>
+        <pc:sldMkLst>
+          <pc:docMk/>
+          <pc:sldMk cId="2163269398" sldId="257"/>
+        </pc:sldMkLst>
+        <pc:spChg chg="mod">
+          <ac:chgData name="Rajat Upadhyay" userId="807f1501-55ff-45fa-a951-74b911a5bfc0" providerId="ADAL" clId="{6A0EC888-83F7-466E-ABCD-08D676997D9C}" dt="2021-08-01T08:47:39.075" v="3" actId="1036"/>
+          <ac:spMkLst>
+            <pc:docMk/>
+            <pc:sldMk cId="2163269398" sldId="257"/>
+            <ac:spMk id="5" creationId="{0E1DEC70-78D2-4F72-801C-6C871932F793}"/>
+          </ac:spMkLst>
+        </pc:spChg>
+        <pc:spChg chg="mod">
+          <ac:chgData name="Rajat Upadhyay" userId="807f1501-55ff-45fa-a951-74b911a5bfc0" providerId="ADAL" clId="{6A0EC888-83F7-466E-ABCD-08D676997D9C}" dt="2021-08-01T08:48:52.629" v="12" actId="1076"/>
+          <ac:spMkLst>
+            <pc:docMk/>
+            <pc:sldMk cId="2163269398" sldId="257"/>
+            <ac:spMk id="17" creationId="{4DA3D6A7-9B86-4149-8A38-C19341E40A95}"/>
+          </ac:spMkLst>
+        </pc:spChg>
+        <pc:spChg chg="mod">
+          <ac:chgData name="Rajat Upadhyay" userId="807f1501-55ff-45fa-a951-74b911a5bfc0" providerId="ADAL" clId="{6A0EC888-83F7-466E-ABCD-08D676997D9C}" dt="2021-08-01T08:48:53.900" v="13" actId="1076"/>
+          <ac:spMkLst>
+            <pc:docMk/>
+            <pc:sldMk cId="2163269398" sldId="257"/>
+            <ac:spMk id="27" creationId="{F1C0B8C0-9FC8-4EE0-9744-C5540B0B78BC}"/>
+          </ac:spMkLst>
+        </pc:spChg>
+        <pc:cxnChg chg="mod">
+          <ac:chgData name="Rajat Upadhyay" userId="807f1501-55ff-45fa-a951-74b911a5bfc0" providerId="ADAL" clId="{6A0EC888-83F7-466E-ABCD-08D676997D9C}" dt="2021-08-01T08:47:39.075" v="3" actId="1036"/>
+          <ac:cxnSpMkLst>
+            <pc:docMk/>
+            <pc:sldMk cId="2163269398" sldId="257"/>
+            <ac:cxnSpMk id="7" creationId="{90B664D1-9719-4DE6-ADEC-80A4D66F435A}"/>
+          </ac:cxnSpMkLst>
+        </pc:cxnChg>
+        <pc:cxnChg chg="mod">
+          <ac:chgData name="Rajat Upadhyay" userId="807f1501-55ff-45fa-a951-74b911a5bfc0" providerId="ADAL" clId="{6A0EC888-83F7-466E-ABCD-08D676997D9C}" dt="2021-08-01T08:47:39.075" v="3" actId="1036"/>
+          <ac:cxnSpMkLst>
+            <pc:docMk/>
+            <pc:sldMk cId="2163269398" sldId="257"/>
+            <ac:cxnSpMk id="14" creationId="{19C1DB8F-881B-467D-81C1-55B28B71F4E8}"/>
+          </ac:cxnSpMkLst>
+        </pc:cxnChg>
+        <pc:cxnChg chg="mod">
+          <ac:chgData name="Rajat Upadhyay" userId="807f1501-55ff-45fa-a951-74b911a5bfc0" providerId="ADAL" clId="{6A0EC888-83F7-466E-ABCD-08D676997D9C}" dt="2021-08-01T08:47:39.075" v="3" actId="1036"/>
+          <ac:cxnSpMkLst>
+            <pc:docMk/>
+            <pc:sldMk cId="2163269398" sldId="257"/>
+            <ac:cxnSpMk id="16" creationId="{51388C41-3171-4CA1-BECF-6CABF78D495B}"/>
+          </ac:cxnSpMkLst>
+        </pc:cxnChg>
+        <pc:cxnChg chg="mod">
+          <ac:chgData name="Rajat Upadhyay" userId="807f1501-55ff-45fa-a951-74b911a5bfc0" providerId="ADAL" clId="{6A0EC888-83F7-466E-ABCD-08D676997D9C}" dt="2021-08-01T08:48:52.629" v="12" actId="1076"/>
+          <ac:cxnSpMkLst>
+            <pc:docMk/>
+            <pc:sldMk cId="2163269398" sldId="257"/>
+            <ac:cxnSpMk id="21" creationId="{8D94DC3D-94B4-494E-859F-CA391B9B77CD}"/>
+          </ac:cxnSpMkLst>
+        </pc:cxnChg>
+        <pc:cxnChg chg="mod">
+          <ac:chgData name="Rajat Upadhyay" userId="807f1501-55ff-45fa-a951-74b911a5bfc0" providerId="ADAL" clId="{6A0EC888-83F7-466E-ABCD-08D676997D9C}" dt="2021-08-01T08:48:53.900" v="13" actId="1076"/>
+          <ac:cxnSpMkLst>
+            <pc:docMk/>
+            <pc:sldMk cId="2163269398" sldId="257"/>
+            <ac:cxnSpMk id="29" creationId="{9EA637F6-9634-4D2F-B1FA-D807E7A6161D}"/>
+          </ac:cxnSpMkLst>
+        </pc:cxnChg>
+        <pc:cxnChg chg="mod">
+          <ac:chgData name="Rajat Upadhyay" userId="807f1501-55ff-45fa-a951-74b911a5bfc0" providerId="ADAL" clId="{6A0EC888-83F7-466E-ABCD-08D676997D9C}" dt="2021-08-01T08:48:52.629" v="12" actId="1076"/>
+          <ac:cxnSpMkLst>
+            <pc:docMk/>
+            <pc:sldMk cId="2163269398" sldId="257"/>
+            <ac:cxnSpMk id="33" creationId="{804AC65A-CF03-44A3-A64C-57BA32702374}"/>
+          </ac:cxnSpMkLst>
+        </pc:cxnChg>
+      </pc:sldChg>
+    </pc:docChg>
+  </pc:docChgLst>
+</pc:chgInfo>
 </file>
 
 <file path=ppt/slideLayouts/slideLayout1.xml><?xml version="1.0" encoding="utf-8"?>
@@ -255,7 +353,7 @@
           <a:p>
             <a:fld id="{18F9E543-4729-4A76-A26E-49D53C6C60ED}" type="datetimeFigureOut">
               <a:rPr lang="en-US" smtClean="0"/>
-              <a:t>7/17/2021</a:t>
+              <a:t>8/1/2021</a:t>
             </a:fld>
             <a:endParaRPr lang="en-US"/>
           </a:p>
@@ -453,7 +551,7 @@
           <a:p>
             <a:fld id="{18F9E543-4729-4A76-A26E-49D53C6C60ED}" type="datetimeFigureOut">
               <a:rPr lang="en-US" smtClean="0"/>
-              <a:t>7/17/2021</a:t>
+              <a:t>8/1/2021</a:t>
             </a:fld>
             <a:endParaRPr lang="en-US"/>
           </a:p>
@@ -661,7 +759,7 @@
           <a:p>
             <a:fld id="{18F9E543-4729-4A76-A26E-49D53C6C60ED}" type="datetimeFigureOut">
               <a:rPr lang="en-US" smtClean="0"/>
-              <a:t>7/17/2021</a:t>
+              <a:t>8/1/2021</a:t>
             </a:fld>
             <a:endParaRPr lang="en-US"/>
           </a:p>
@@ -859,7 +957,7 @@
           <a:p>
             <a:fld id="{18F9E543-4729-4A76-A26E-49D53C6C60ED}" type="datetimeFigureOut">
               <a:rPr lang="en-US" smtClean="0"/>
-              <a:t>7/17/2021</a:t>
+              <a:t>8/1/2021</a:t>
             </a:fld>
             <a:endParaRPr lang="en-US"/>
           </a:p>
@@ -1134,7 +1232,7 @@
           <a:p>
             <a:fld id="{18F9E543-4729-4A76-A26E-49D53C6C60ED}" type="datetimeFigureOut">
               <a:rPr lang="en-US" smtClean="0"/>
-              <a:t>7/17/2021</a:t>
+              <a:t>8/1/2021</a:t>
             </a:fld>
             <a:endParaRPr lang="en-US"/>
           </a:p>
@@ -1399,7 +1497,7 @@
           <a:p>
             <a:fld id="{18F9E543-4729-4A76-A26E-49D53C6C60ED}" type="datetimeFigureOut">
               <a:rPr lang="en-US" smtClean="0"/>
-              <a:t>7/17/2021</a:t>
+              <a:t>8/1/2021</a:t>
             </a:fld>
             <a:endParaRPr lang="en-US"/>
           </a:p>
@@ -1811,7 +1909,7 @@
           <a:p>
             <a:fld id="{18F9E543-4729-4A76-A26E-49D53C6C60ED}" type="datetimeFigureOut">
               <a:rPr lang="en-US" smtClean="0"/>
-              <a:t>7/17/2021</a:t>
+              <a:t>8/1/2021</a:t>
             </a:fld>
             <a:endParaRPr lang="en-US"/>
           </a:p>
@@ -1952,7 +2050,7 @@
           <a:p>
             <a:fld id="{18F9E543-4729-4A76-A26E-49D53C6C60ED}" type="datetimeFigureOut">
               <a:rPr lang="en-US" smtClean="0"/>
-              <a:t>7/17/2021</a:t>
+              <a:t>8/1/2021</a:t>
             </a:fld>
             <a:endParaRPr lang="en-US"/>
           </a:p>
@@ -2065,7 +2163,7 @@
           <a:p>
             <a:fld id="{18F9E543-4729-4A76-A26E-49D53C6C60ED}" type="datetimeFigureOut">
               <a:rPr lang="en-US" smtClean="0"/>
-              <a:t>7/17/2021</a:t>
+              <a:t>8/1/2021</a:t>
             </a:fld>
             <a:endParaRPr lang="en-US"/>
           </a:p>
@@ -2376,7 +2474,7 @@
           <a:p>
             <a:fld id="{18F9E543-4729-4A76-A26E-49D53C6C60ED}" type="datetimeFigureOut">
               <a:rPr lang="en-US" smtClean="0"/>
-              <a:t>7/17/2021</a:t>
+              <a:t>8/1/2021</a:t>
             </a:fld>
             <a:endParaRPr lang="en-US"/>
           </a:p>
@@ -2664,7 +2762,7 @@
           <a:p>
             <a:fld id="{18F9E543-4729-4A76-A26E-49D53C6C60ED}" type="datetimeFigureOut">
               <a:rPr lang="en-US" smtClean="0"/>
-              <a:t>7/17/2021</a:t>
+              <a:t>8/1/2021</a:t>
             </a:fld>
             <a:endParaRPr lang="en-US"/>
           </a:p>
@@ -2905,7 +3003,7 @@
           <a:p>
             <a:fld id="{18F9E543-4729-4A76-A26E-49D53C6C60ED}" type="datetimeFigureOut">
               <a:rPr lang="en-US" smtClean="0"/>
-              <a:t>7/17/2021</a:t>
+              <a:t>8/1/2021</a:t>
             </a:fld>
             <a:endParaRPr lang="en-US"/>
           </a:p>
@@ -3471,7 +3569,7 @@
         </p:nvSpPr>
         <p:spPr>
           <a:xfrm>
-            <a:off x="2200275" y="2619375"/>
+            <a:off x="2200275" y="2628900"/>
             <a:ext cx="6324600" cy="1123950"/>
           </a:xfrm>
           <a:prstGeom prst="rect">
@@ -3523,8 +3621,8 @@
         </p:nvCxnSpPr>
         <p:spPr>
           <a:xfrm>
-            <a:off x="5362575" y="3743325"/>
-            <a:ext cx="89535" cy="869315"/>
+            <a:off x="5362575" y="3752850"/>
+            <a:ext cx="89535" cy="859790"/>
           </a:xfrm>
           <a:prstGeom prst="straightConnector1">
             <a:avLst/>
@@ -3671,8 +3769,8 @@
         </p:nvCxnSpPr>
         <p:spPr>
           <a:xfrm flipH="1">
-            <a:off x="1316355" y="3743325"/>
-            <a:ext cx="4046220" cy="755015"/>
+            <a:off x="1316355" y="3752850"/>
+            <a:ext cx="4046220" cy="745490"/>
           </a:xfrm>
           <a:prstGeom prst="straightConnector1">
             <a:avLst/>
@@ -3713,8 +3811,8 @@
         </p:nvCxnSpPr>
         <p:spPr>
           <a:xfrm>
-            <a:off x="5362575" y="3743325"/>
-            <a:ext cx="4314825" cy="434657"/>
+            <a:off x="5362575" y="3752850"/>
+            <a:ext cx="4314825" cy="425132"/>
           </a:xfrm>
           <a:prstGeom prst="straightConnector1">
             <a:avLst/>
@@ -3752,7 +3850,7 @@
         </p:nvSpPr>
         <p:spPr>
           <a:xfrm>
-            <a:off x="1847850" y="466725"/>
+            <a:off x="1838325" y="390525"/>
             <a:ext cx="6867525" cy="755015"/>
           </a:xfrm>
           <a:prstGeom prst="rect">
@@ -3804,8 +3902,8 @@
         </p:nvCxnSpPr>
         <p:spPr>
           <a:xfrm>
-            <a:off x="5281613" y="1221740"/>
-            <a:ext cx="80962" cy="1397635"/>
+            <a:off x="5272088" y="1145540"/>
+            <a:ext cx="90487" cy="1483360"/>
           </a:xfrm>
           <a:prstGeom prst="straightConnector1">
             <a:avLst/>
@@ -3892,7 +3990,7 @@
         </p:nvSpPr>
         <p:spPr>
           <a:xfrm>
-            <a:off x="114300" y="1564799"/>
+            <a:off x="114300" y="1660049"/>
             <a:ext cx="2265045" cy="801052"/>
           </a:xfrm>
           <a:prstGeom prst="rect">
@@ -3949,8 +4047,8 @@
         </p:nvCxnSpPr>
         <p:spPr>
           <a:xfrm flipH="1">
-            <a:off x="1246823" y="1221740"/>
-            <a:ext cx="4034790" cy="343059"/>
+            <a:off x="1246823" y="1145540"/>
+            <a:ext cx="4025265" cy="514509"/>
           </a:xfrm>
           <a:prstGeom prst="straightConnector1">
             <a:avLst/>
@@ -3990,7 +4088,7 @@
         </p:nvCxnSpPr>
         <p:spPr>
           <a:xfrm>
-            <a:off x="5281613" y="1221740"/>
+            <a:off x="5272088" y="1145540"/>
             <a:ext cx="4252912" cy="273684"/>
           </a:xfrm>
           <a:prstGeom prst="straightConnector1">

</xml_diff>